<commit_message>
Add solutions day4 and slides day5
</commit_message>
<xml_diff>
--- a/presentations/edatc21_slides_04_horace2.pptx
+++ b/presentations/edatc21_slides_04_horace2.pptx
@@ -8276,7 +8276,7 @@
                 <a:latin typeface="Courier New" panose="02070309020205020404" pitchFamily="49" charset="0"/>
                 <a:cs typeface="Courier New" panose="02070309020205020404" pitchFamily="49" charset="0"/>
               </a:rPr>
-              <a:t>xc = par(1); </a:t>
+              <a:t>  xc = par(1); </a:t>
             </a:r>
             <a:r>
               <a:rPr lang="en-GB" sz="1400" dirty="0" err="1" smtClean="0">
@@ -8309,7 +8309,7 @@
                 <a:latin typeface="Courier New" panose="02070309020205020404" pitchFamily="49" charset="0"/>
                 <a:cs typeface="Courier New" panose="02070309020205020404" pitchFamily="49" charset="0"/>
               </a:rPr>
-              <a:t>  </a:t>
+              <a:t>    </a:t>
             </a:r>
             <a:r>
               <a:rPr lang="en-GB" sz="1400" dirty="0" err="1" smtClean="0">
@@ -8345,18 +8345,25 @@
               <a:buNone/>
             </a:pPr>
             <a:r>
-              <a:rPr lang="en-GB" sz="1400" dirty="0">
+              <a:rPr lang="en-GB" sz="1400">
                 <a:latin typeface="Courier New" panose="02070309020205020404" pitchFamily="49" charset="0"/>
                 <a:cs typeface="Courier New" panose="02070309020205020404" pitchFamily="49" charset="0"/>
               </a:rPr>
               <a:t> </a:t>
             </a:r>
             <a:r>
+              <a:rPr lang="en-GB" sz="1400" smtClean="0">
+                <a:latin typeface="Courier New" panose="02070309020205020404" pitchFamily="49" charset="0"/>
+                <a:cs typeface="Courier New" panose="02070309020205020404" pitchFamily="49" charset="0"/>
+              </a:rPr>
+              <a:t>   out </a:t>
+            </a:r>
+            <a:r>
               <a:rPr lang="en-GB" sz="1400" dirty="0" smtClean="0">
                 <a:latin typeface="Courier New" panose="02070309020205020404" pitchFamily="49" charset="0"/>
                 <a:cs typeface="Courier New" panose="02070309020205020404" pitchFamily="49" charset="0"/>
               </a:rPr>
-              <a:t> out = par(5) * </a:t>
+              <a:t>= par(5) * </a:t>
             </a:r>
             <a:r>
               <a:rPr lang="en-GB" sz="1400" dirty="0" err="1" smtClean="0">
@@ -8675,98 +8682,113 @@
           </a:prstGeom>
         </p:spPr>
       </p:pic>
-      <p:sp>
-        <p:nvSpPr>
-          <p:cNvPr id="6" name="Rectangle 5"/>
-          <p:cNvSpPr/>
+      <p:grpSp>
+        <p:nvGrpSpPr>
+          <p:cNvPr id="8" name="Group 7"/>
+          <p:cNvGrpSpPr/>
           <p:nvPr/>
-        </p:nvSpPr>
-        <p:spPr>
+        </p:nvGrpSpPr>
+        <p:grpSpPr>
           <a:xfrm>
             <a:off x="2803585" y="2967487"/>
-            <a:ext cx="379562" cy="232913"/>
+            <a:ext cx="1052424" cy="1618890"/>
+            <a:chOff x="2803585" y="2967487"/>
+            <a:chExt cx="1052424" cy="1618890"/>
           </a:xfrm>
-          <a:prstGeom prst="rect">
-            <a:avLst/>
-          </a:prstGeom>
-          <a:noFill/>
-          <a:ln>
-            <a:solidFill>
-              <a:srgbClr val="FF0000"/>
-            </a:solidFill>
-          </a:ln>
-        </p:spPr>
-        <p:style>
-          <a:lnRef idx="2">
-            <a:schemeClr val="accent1">
-              <a:shade val="50000"/>
-            </a:schemeClr>
-          </a:lnRef>
-          <a:fillRef idx="1">
-            <a:schemeClr val="accent1"/>
-          </a:fillRef>
-          <a:effectRef idx="0">
-            <a:schemeClr val="accent1"/>
-          </a:effectRef>
-          <a:fontRef idx="minor">
-            <a:schemeClr val="lt1"/>
-          </a:fontRef>
-        </p:style>
-        <p:txBody>
-          <a:bodyPr rtlCol="0" anchor="ctr"/>
-          <a:lstStyle/>
-          <a:p>
-            <a:pPr algn="ctr"/>
-            <a:endParaRPr lang="en-GB"/>
-          </a:p>
-        </p:txBody>
-      </p:sp>
-      <p:sp>
-        <p:nvSpPr>
-          <p:cNvPr id="7" name="Rectangle 6"/>
-          <p:cNvSpPr/>
-          <p:nvPr/>
-        </p:nvSpPr>
-        <p:spPr>
-          <a:xfrm>
-            <a:off x="3312543" y="4353464"/>
-            <a:ext cx="543466" cy="232913"/>
-          </a:xfrm>
-          <a:prstGeom prst="rect">
-            <a:avLst/>
-          </a:prstGeom>
-          <a:noFill/>
-          <a:ln>
-            <a:solidFill>
-              <a:srgbClr val="FF0000"/>
-            </a:solidFill>
-          </a:ln>
-        </p:spPr>
-        <p:style>
-          <a:lnRef idx="2">
-            <a:schemeClr val="accent1">
-              <a:shade val="50000"/>
-            </a:schemeClr>
-          </a:lnRef>
-          <a:fillRef idx="1">
-            <a:schemeClr val="accent1"/>
-          </a:fillRef>
-          <a:effectRef idx="0">
-            <a:schemeClr val="accent1"/>
-          </a:effectRef>
-          <a:fontRef idx="minor">
-            <a:schemeClr val="lt1"/>
-          </a:fontRef>
-        </p:style>
-        <p:txBody>
-          <a:bodyPr rtlCol="0" anchor="ctr"/>
-          <a:lstStyle/>
-          <a:p>
-            <a:pPr algn="ctr"/>
-            <a:endParaRPr lang="en-GB"/>
-          </a:p>
-        </p:txBody>
-      </p:sp>
+        </p:grpSpPr>
+        <p:sp>
+          <p:nvSpPr>
+            <p:cNvPr id="6" name="Rectangle 5"/>
+            <p:cNvSpPr/>
+            <p:nvPr/>
+          </p:nvSpPr>
+          <p:spPr>
+            <a:xfrm>
+              <a:off x="2803585" y="2967487"/>
+              <a:ext cx="379562" cy="232913"/>
+            </a:xfrm>
+            <a:prstGeom prst="rect">
+              <a:avLst/>
+            </a:prstGeom>
+            <a:noFill/>
+            <a:ln>
+              <a:solidFill>
+                <a:srgbClr val="FF0000"/>
+              </a:solidFill>
+            </a:ln>
+          </p:spPr>
+          <p:style>
+            <a:lnRef idx="2">
+              <a:schemeClr val="accent1">
+                <a:shade val="50000"/>
+              </a:schemeClr>
+            </a:lnRef>
+            <a:fillRef idx="1">
+              <a:schemeClr val="accent1"/>
+            </a:fillRef>
+            <a:effectRef idx="0">
+              <a:schemeClr val="accent1"/>
+            </a:effectRef>
+            <a:fontRef idx="minor">
+              <a:schemeClr val="lt1"/>
+            </a:fontRef>
+          </p:style>
+          <p:txBody>
+            <a:bodyPr rtlCol="0" anchor="ctr"/>
+            <a:lstStyle/>
+            <a:p>
+              <a:pPr algn="ctr"/>
+              <a:endParaRPr lang="en-GB"/>
+            </a:p>
+          </p:txBody>
+        </p:sp>
+        <p:sp>
+          <p:nvSpPr>
+            <p:cNvPr id="7" name="Rectangle 6"/>
+            <p:cNvSpPr/>
+            <p:nvPr/>
+          </p:nvSpPr>
+          <p:spPr>
+            <a:xfrm>
+              <a:off x="3312543" y="4353464"/>
+              <a:ext cx="543466" cy="232913"/>
+            </a:xfrm>
+            <a:prstGeom prst="rect">
+              <a:avLst/>
+            </a:prstGeom>
+            <a:noFill/>
+            <a:ln>
+              <a:solidFill>
+                <a:srgbClr val="FF0000"/>
+              </a:solidFill>
+            </a:ln>
+          </p:spPr>
+          <p:style>
+            <a:lnRef idx="2">
+              <a:schemeClr val="accent1">
+                <a:shade val="50000"/>
+              </a:schemeClr>
+            </a:lnRef>
+            <a:fillRef idx="1">
+              <a:schemeClr val="accent1"/>
+            </a:fillRef>
+            <a:effectRef idx="0">
+              <a:schemeClr val="accent1"/>
+            </a:effectRef>
+            <a:fontRef idx="minor">
+              <a:schemeClr val="lt1"/>
+            </a:fontRef>
+          </p:style>
+          <p:txBody>
+            <a:bodyPr rtlCol="0" anchor="ctr"/>
+            <a:lstStyle/>
+            <a:p>
+              <a:pPr algn="ctr"/>
+              <a:endParaRPr lang="en-GB"/>
+            </a:p>
+          </p:txBody>
+        </p:sp>
+      </p:grpSp>
     </p:spTree>
     <p:extLst>
       <p:ext uri="{BB962C8B-B14F-4D97-AF65-F5344CB8AC3E}">
@@ -9220,33 +9242,15 @@
                                   </p:childTnLst>
                                 </p:cTn>
                               </p:par>
-                            </p:childTnLst>
-                          </p:cTn>
-                        </p:par>
-                      </p:childTnLst>
-                    </p:cTn>
-                  </p:par>
-                  <p:par>
-                    <p:cTn id="35" fill="hold">
-                      <p:stCondLst>
-                        <p:cond delay="indefinite"/>
-                      </p:stCondLst>
-                      <p:childTnLst>
-                        <p:par>
-                          <p:cTn id="36" fill="hold">
-                            <p:stCondLst>
-                              <p:cond delay="0"/>
-                            </p:stCondLst>
-                            <p:childTnLst>
                               <p:par>
-                                <p:cTn id="37" presetID="1" presetClass="entr" presetSubtype="0" fill="hold" grpId="0" nodeType="clickEffect">
+                                <p:cTn id="35" presetID="1" presetClass="entr" presetSubtype="0" fill="hold" grpId="0" nodeType="withEffect">
                                   <p:stCondLst>
                                     <p:cond delay="0"/>
                                   </p:stCondLst>
                                   <p:childTnLst>
                                     <p:set>
                                       <p:cBhvr>
-                                        <p:cTn id="38" dur="1" fill="hold">
+                                        <p:cTn id="36" dur="1" fill="hold">
                                           <p:stCondLst>
                                             <p:cond delay="0"/>
                                           </p:stCondLst>
@@ -9276,26 +9280,71 @@
                     </p:cTn>
                   </p:par>
                   <p:par>
-                    <p:cTn id="39" fill="hold">
+                    <p:cTn id="37" fill="hold">
                       <p:stCondLst>
                         <p:cond delay="indefinite"/>
                       </p:stCondLst>
                       <p:childTnLst>
                         <p:par>
-                          <p:cTn id="40" fill="hold">
+                          <p:cTn id="38" fill="hold">
                             <p:stCondLst>
                               <p:cond delay="0"/>
                             </p:stCondLst>
                             <p:childTnLst>
                               <p:par>
-                                <p:cTn id="41" presetID="1" presetClass="entr" presetSubtype="0" fill="hold" nodeType="clickEffect">
+                                <p:cTn id="39" presetID="1" presetClass="entr" presetSubtype="0" fill="hold" nodeType="clickEffect">
                                   <p:stCondLst>
                                     <p:cond delay="0"/>
                                   </p:stCondLst>
                                   <p:childTnLst>
                                     <p:set>
                                       <p:cBhvr>
-                                        <p:cTn id="42" dur="1" fill="hold">
+                                        <p:cTn id="40" dur="1" fill="hold">
+                                          <p:stCondLst>
+                                            <p:cond delay="0"/>
+                                          </p:stCondLst>
+                                        </p:cTn>
+                                        <p:tgtEl>
+                                          <p:spTgt spid="8"/>
+                                        </p:tgtEl>
+                                        <p:attrNameLst>
+                                          <p:attrName>style.visibility</p:attrName>
+                                        </p:attrNameLst>
+                                      </p:cBhvr>
+                                      <p:to>
+                                        <p:strVal val="visible"/>
+                                      </p:to>
+                                    </p:set>
+                                  </p:childTnLst>
+                                </p:cTn>
+                              </p:par>
+                            </p:childTnLst>
+                          </p:cTn>
+                        </p:par>
+                      </p:childTnLst>
+                    </p:cTn>
+                  </p:par>
+                  <p:par>
+                    <p:cTn id="41" fill="hold">
+                      <p:stCondLst>
+                        <p:cond delay="indefinite"/>
+                      </p:stCondLst>
+                      <p:childTnLst>
+                        <p:par>
+                          <p:cTn id="42" fill="hold">
+                            <p:stCondLst>
+                              <p:cond delay="0"/>
+                            </p:stCondLst>
+                            <p:childTnLst>
+                              <p:par>
+                                <p:cTn id="43" presetID="1" presetClass="entr" presetSubtype="0" fill="hold" nodeType="clickEffect">
+                                  <p:stCondLst>
+                                    <p:cond delay="0"/>
+                                  </p:stCondLst>
+                                  <p:childTnLst>
+                                    <p:set>
+                                      <p:cBhvr>
+                                        <p:cTn id="44" dur="1" fill="hold">
                                           <p:stCondLst>
                                             <p:cond delay="0"/>
                                           </p:stCondLst>
@@ -9932,98 +9981,113 @@
           </a:p>
         </p:txBody>
       </p:sp>
-      <p:sp>
-        <p:nvSpPr>
-          <p:cNvPr id="6" name="Rectangle 5"/>
-          <p:cNvSpPr/>
+      <p:grpSp>
+        <p:nvGrpSpPr>
+          <p:cNvPr id="10" name="Group 9"/>
+          <p:cNvGrpSpPr/>
           <p:nvPr/>
-        </p:nvSpPr>
-        <p:spPr>
+        </p:nvGrpSpPr>
+        <p:grpSpPr>
           <a:xfrm>
             <a:off x="2803584" y="2967487"/>
-            <a:ext cx="681487" cy="232913"/>
+            <a:ext cx="1250831" cy="1601638"/>
+            <a:chOff x="2803584" y="2967487"/>
+            <a:chExt cx="1250831" cy="1601638"/>
           </a:xfrm>
-          <a:prstGeom prst="rect">
-            <a:avLst/>
-          </a:prstGeom>
-          <a:noFill/>
-          <a:ln>
-            <a:solidFill>
-              <a:srgbClr val="FF0000"/>
-            </a:solidFill>
-          </a:ln>
-        </p:spPr>
-        <p:style>
-          <a:lnRef idx="2">
-            <a:schemeClr val="accent1">
-              <a:shade val="50000"/>
-            </a:schemeClr>
-          </a:lnRef>
-          <a:fillRef idx="1">
-            <a:schemeClr val="accent1"/>
-          </a:fillRef>
-          <a:effectRef idx="0">
-            <a:schemeClr val="accent1"/>
-          </a:effectRef>
-          <a:fontRef idx="minor">
-            <a:schemeClr val="lt1"/>
-          </a:fontRef>
-        </p:style>
-        <p:txBody>
-          <a:bodyPr rtlCol="0" anchor="ctr"/>
-          <a:lstStyle/>
-          <a:p>
-            <a:pPr algn="ctr"/>
-            <a:endParaRPr lang="en-GB"/>
-          </a:p>
-        </p:txBody>
-      </p:sp>
-      <p:sp>
-        <p:nvSpPr>
-          <p:cNvPr id="7" name="Rectangle 6"/>
-          <p:cNvSpPr/>
-          <p:nvPr/>
-        </p:nvSpPr>
-        <p:spPr>
-          <a:xfrm>
-            <a:off x="3152954" y="4336212"/>
-            <a:ext cx="901461" cy="232913"/>
-          </a:xfrm>
-          <a:prstGeom prst="rect">
-            <a:avLst/>
-          </a:prstGeom>
-          <a:noFill/>
-          <a:ln>
-            <a:solidFill>
-              <a:srgbClr val="FF0000"/>
-            </a:solidFill>
-          </a:ln>
-        </p:spPr>
-        <p:style>
-          <a:lnRef idx="2">
-            <a:schemeClr val="accent1">
-              <a:shade val="50000"/>
-            </a:schemeClr>
-          </a:lnRef>
-          <a:fillRef idx="1">
-            <a:schemeClr val="accent1"/>
-          </a:fillRef>
-          <a:effectRef idx="0">
-            <a:schemeClr val="accent1"/>
-          </a:effectRef>
-          <a:fontRef idx="minor">
-            <a:schemeClr val="lt1"/>
-          </a:fontRef>
-        </p:style>
-        <p:txBody>
-          <a:bodyPr rtlCol="0" anchor="ctr"/>
-          <a:lstStyle/>
-          <a:p>
-            <a:pPr algn="ctr"/>
-            <a:endParaRPr lang="en-GB"/>
-          </a:p>
-        </p:txBody>
-      </p:sp>
+        </p:grpSpPr>
+        <p:sp>
+          <p:nvSpPr>
+            <p:cNvPr id="6" name="Rectangle 5"/>
+            <p:cNvSpPr/>
+            <p:nvPr/>
+          </p:nvSpPr>
+          <p:spPr>
+            <a:xfrm>
+              <a:off x="2803584" y="2967487"/>
+              <a:ext cx="681487" cy="232913"/>
+            </a:xfrm>
+            <a:prstGeom prst="rect">
+              <a:avLst/>
+            </a:prstGeom>
+            <a:noFill/>
+            <a:ln>
+              <a:solidFill>
+                <a:srgbClr val="FF0000"/>
+              </a:solidFill>
+            </a:ln>
+          </p:spPr>
+          <p:style>
+            <a:lnRef idx="2">
+              <a:schemeClr val="accent1">
+                <a:shade val="50000"/>
+              </a:schemeClr>
+            </a:lnRef>
+            <a:fillRef idx="1">
+              <a:schemeClr val="accent1"/>
+            </a:fillRef>
+            <a:effectRef idx="0">
+              <a:schemeClr val="accent1"/>
+            </a:effectRef>
+            <a:fontRef idx="minor">
+              <a:schemeClr val="lt1"/>
+            </a:fontRef>
+          </p:style>
+          <p:txBody>
+            <a:bodyPr rtlCol="0" anchor="ctr"/>
+            <a:lstStyle/>
+            <a:p>
+              <a:pPr algn="ctr"/>
+              <a:endParaRPr lang="en-GB"/>
+            </a:p>
+          </p:txBody>
+        </p:sp>
+        <p:sp>
+          <p:nvSpPr>
+            <p:cNvPr id="7" name="Rectangle 6"/>
+            <p:cNvSpPr/>
+            <p:nvPr/>
+          </p:nvSpPr>
+          <p:spPr>
+            <a:xfrm>
+              <a:off x="3152954" y="4336212"/>
+              <a:ext cx="901461" cy="232913"/>
+            </a:xfrm>
+            <a:prstGeom prst="rect">
+              <a:avLst/>
+            </a:prstGeom>
+            <a:noFill/>
+            <a:ln>
+              <a:solidFill>
+                <a:srgbClr val="FF0000"/>
+              </a:solidFill>
+            </a:ln>
+          </p:spPr>
+          <p:style>
+            <a:lnRef idx="2">
+              <a:schemeClr val="accent1">
+                <a:shade val="50000"/>
+              </a:schemeClr>
+            </a:lnRef>
+            <a:fillRef idx="1">
+              <a:schemeClr val="accent1"/>
+            </a:fillRef>
+            <a:effectRef idx="0">
+              <a:schemeClr val="accent1"/>
+            </a:effectRef>
+            <a:fontRef idx="minor">
+              <a:schemeClr val="lt1"/>
+            </a:fontRef>
+          </p:style>
+          <p:txBody>
+            <a:bodyPr rtlCol="0" anchor="ctr"/>
+            <a:lstStyle/>
+            <a:p>
+              <a:pPr algn="ctr"/>
+              <a:endParaRPr lang="en-GB"/>
+            </a:p>
+          </p:txBody>
+        </p:sp>
+      </p:grpSp>
       <p:pic>
         <p:nvPicPr>
           <p:cNvPr id="9" name="Picture 8"/>
@@ -10501,33 +10565,15 @@
                                   </p:childTnLst>
                                 </p:cTn>
                               </p:par>
-                            </p:childTnLst>
-                          </p:cTn>
-                        </p:par>
-                      </p:childTnLst>
-                    </p:cTn>
-                  </p:par>
-                  <p:par>
-                    <p:cTn id="35" fill="hold">
-                      <p:stCondLst>
-                        <p:cond delay="indefinite"/>
-                      </p:stCondLst>
-                      <p:childTnLst>
-                        <p:par>
-                          <p:cTn id="36" fill="hold">
-                            <p:stCondLst>
-                              <p:cond delay="0"/>
-                            </p:stCondLst>
-                            <p:childTnLst>
                               <p:par>
-                                <p:cTn id="37" presetID="1" presetClass="entr" presetSubtype="0" fill="hold" grpId="0" nodeType="clickEffect">
+                                <p:cTn id="35" presetID="1" presetClass="entr" presetSubtype="0" fill="hold" grpId="0" nodeType="withEffect">
                                   <p:stCondLst>
                                     <p:cond delay="0"/>
                                   </p:stCondLst>
                                   <p:childTnLst>
                                     <p:set>
                                       <p:cBhvr>
-                                        <p:cTn id="38" dur="1" fill="hold">
+                                        <p:cTn id="36" dur="1" fill="hold">
                                           <p:stCondLst>
                                             <p:cond delay="0"/>
                                           </p:stCondLst>
@@ -10557,26 +10603,71 @@
                     </p:cTn>
                   </p:par>
                   <p:par>
-                    <p:cTn id="39" fill="hold">
+                    <p:cTn id="37" fill="hold">
                       <p:stCondLst>
                         <p:cond delay="indefinite"/>
                       </p:stCondLst>
                       <p:childTnLst>
                         <p:par>
-                          <p:cTn id="40" fill="hold">
+                          <p:cTn id="38" fill="hold">
                             <p:stCondLst>
                               <p:cond delay="0"/>
                             </p:stCondLst>
                             <p:childTnLst>
                               <p:par>
-                                <p:cTn id="41" presetID="1" presetClass="entr" presetSubtype="0" fill="hold" nodeType="clickEffect">
+                                <p:cTn id="39" presetID="1" presetClass="entr" presetSubtype="0" fill="hold" nodeType="clickEffect">
                                   <p:stCondLst>
                                     <p:cond delay="0"/>
                                   </p:stCondLst>
                                   <p:childTnLst>
                                     <p:set>
                                       <p:cBhvr>
-                                        <p:cTn id="42" dur="1" fill="hold">
+                                        <p:cTn id="40" dur="1" fill="hold">
+                                          <p:stCondLst>
+                                            <p:cond delay="0"/>
+                                          </p:stCondLst>
+                                        </p:cTn>
+                                        <p:tgtEl>
+                                          <p:spTgt spid="10"/>
+                                        </p:tgtEl>
+                                        <p:attrNameLst>
+                                          <p:attrName>style.visibility</p:attrName>
+                                        </p:attrNameLst>
+                                      </p:cBhvr>
+                                      <p:to>
+                                        <p:strVal val="visible"/>
+                                      </p:to>
+                                    </p:set>
+                                  </p:childTnLst>
+                                </p:cTn>
+                              </p:par>
+                            </p:childTnLst>
+                          </p:cTn>
+                        </p:par>
+                      </p:childTnLst>
+                    </p:cTn>
+                  </p:par>
+                  <p:par>
+                    <p:cTn id="41" fill="hold">
+                      <p:stCondLst>
+                        <p:cond delay="indefinite"/>
+                      </p:stCondLst>
+                      <p:childTnLst>
+                        <p:par>
+                          <p:cTn id="42" fill="hold">
+                            <p:stCondLst>
+                              <p:cond delay="0"/>
+                            </p:stCondLst>
+                            <p:childTnLst>
+                              <p:par>
+                                <p:cTn id="43" presetID="1" presetClass="entr" presetSubtype="0" fill="hold" nodeType="clickEffect">
+                                  <p:stCondLst>
+                                    <p:cond delay="0"/>
+                                  </p:stCondLst>
+                                  <p:childTnLst>
+                                    <p:set>
+                                      <p:cBhvr>
+                                        <p:cTn id="44" dur="1" fill="hold">
                                           <p:stCondLst>
                                             <p:cond delay="0"/>
                                           </p:stCondLst>
@@ -11274,98 +11365,113 @@
           </a:p>
         </p:txBody>
       </p:sp>
-      <p:sp>
-        <p:nvSpPr>
-          <p:cNvPr id="6" name="Rectangle 5"/>
-          <p:cNvSpPr/>
+      <p:grpSp>
+        <p:nvGrpSpPr>
+          <p:cNvPr id="8" name="Group 7"/>
+          <p:cNvGrpSpPr/>
           <p:nvPr/>
-        </p:nvSpPr>
-        <p:spPr>
+        </p:nvGrpSpPr>
+        <p:grpSpPr>
           <a:xfrm>
             <a:off x="3053752" y="2975311"/>
-            <a:ext cx="737560" cy="232913"/>
+            <a:ext cx="1263769" cy="1944456"/>
+            <a:chOff x="3053752" y="2975311"/>
+            <a:chExt cx="1263769" cy="1944456"/>
           </a:xfrm>
-          <a:prstGeom prst="rect">
-            <a:avLst/>
-          </a:prstGeom>
-          <a:noFill/>
-          <a:ln>
-            <a:solidFill>
-              <a:srgbClr val="FF0000"/>
-            </a:solidFill>
-          </a:ln>
-        </p:spPr>
-        <p:style>
-          <a:lnRef idx="2">
-            <a:schemeClr val="accent1">
-              <a:shade val="50000"/>
-            </a:schemeClr>
-          </a:lnRef>
-          <a:fillRef idx="1">
-            <a:schemeClr val="accent1"/>
-          </a:fillRef>
-          <a:effectRef idx="0">
-            <a:schemeClr val="accent1"/>
-          </a:effectRef>
-          <a:fontRef idx="minor">
-            <a:schemeClr val="lt1"/>
-          </a:fontRef>
-        </p:style>
-        <p:txBody>
-          <a:bodyPr rtlCol="0" anchor="ctr"/>
-          <a:lstStyle/>
-          <a:p>
-            <a:pPr algn="ctr"/>
-            <a:endParaRPr lang="en-GB"/>
-          </a:p>
-        </p:txBody>
-      </p:sp>
-      <p:sp>
-        <p:nvSpPr>
-          <p:cNvPr id="7" name="Rectangle 6"/>
-          <p:cNvSpPr/>
-          <p:nvPr/>
-        </p:nvSpPr>
-        <p:spPr>
-          <a:xfrm>
-            <a:off x="3329796" y="4686854"/>
-            <a:ext cx="987725" cy="232913"/>
-          </a:xfrm>
-          <a:prstGeom prst="rect">
-            <a:avLst/>
-          </a:prstGeom>
-          <a:noFill/>
-          <a:ln>
-            <a:solidFill>
-              <a:srgbClr val="FF0000"/>
-            </a:solidFill>
-          </a:ln>
-        </p:spPr>
-        <p:style>
-          <a:lnRef idx="2">
-            <a:schemeClr val="accent1">
-              <a:shade val="50000"/>
-            </a:schemeClr>
-          </a:lnRef>
-          <a:fillRef idx="1">
-            <a:schemeClr val="accent1"/>
-          </a:fillRef>
-          <a:effectRef idx="0">
-            <a:schemeClr val="accent1"/>
-          </a:effectRef>
-          <a:fontRef idx="minor">
-            <a:schemeClr val="lt1"/>
-          </a:fontRef>
-        </p:style>
-        <p:txBody>
-          <a:bodyPr rtlCol="0" anchor="ctr"/>
-          <a:lstStyle/>
-          <a:p>
-            <a:pPr algn="ctr"/>
-            <a:endParaRPr lang="en-GB"/>
-          </a:p>
-        </p:txBody>
-      </p:sp>
+        </p:grpSpPr>
+        <p:sp>
+          <p:nvSpPr>
+            <p:cNvPr id="6" name="Rectangle 5"/>
+            <p:cNvSpPr/>
+            <p:nvPr/>
+          </p:nvSpPr>
+          <p:spPr>
+            <a:xfrm>
+              <a:off x="3053752" y="2975311"/>
+              <a:ext cx="737560" cy="232913"/>
+            </a:xfrm>
+            <a:prstGeom prst="rect">
+              <a:avLst/>
+            </a:prstGeom>
+            <a:noFill/>
+            <a:ln>
+              <a:solidFill>
+                <a:srgbClr val="FF0000"/>
+              </a:solidFill>
+            </a:ln>
+          </p:spPr>
+          <p:style>
+            <a:lnRef idx="2">
+              <a:schemeClr val="accent1">
+                <a:shade val="50000"/>
+              </a:schemeClr>
+            </a:lnRef>
+            <a:fillRef idx="1">
+              <a:schemeClr val="accent1"/>
+            </a:fillRef>
+            <a:effectRef idx="0">
+              <a:schemeClr val="accent1"/>
+            </a:effectRef>
+            <a:fontRef idx="minor">
+              <a:schemeClr val="lt1"/>
+            </a:fontRef>
+          </p:style>
+          <p:txBody>
+            <a:bodyPr rtlCol="0" anchor="ctr"/>
+            <a:lstStyle/>
+            <a:p>
+              <a:pPr algn="ctr"/>
+              <a:endParaRPr lang="en-GB"/>
+            </a:p>
+          </p:txBody>
+        </p:sp>
+        <p:sp>
+          <p:nvSpPr>
+            <p:cNvPr id="7" name="Rectangle 6"/>
+            <p:cNvSpPr/>
+            <p:nvPr/>
+          </p:nvSpPr>
+          <p:spPr>
+            <a:xfrm>
+              <a:off x="3329796" y="4686854"/>
+              <a:ext cx="987725" cy="232913"/>
+            </a:xfrm>
+            <a:prstGeom prst="rect">
+              <a:avLst/>
+            </a:prstGeom>
+            <a:noFill/>
+            <a:ln>
+              <a:solidFill>
+                <a:srgbClr val="FF0000"/>
+              </a:solidFill>
+            </a:ln>
+          </p:spPr>
+          <p:style>
+            <a:lnRef idx="2">
+              <a:schemeClr val="accent1">
+                <a:shade val="50000"/>
+              </a:schemeClr>
+            </a:lnRef>
+            <a:fillRef idx="1">
+              <a:schemeClr val="accent1"/>
+            </a:fillRef>
+            <a:effectRef idx="0">
+              <a:schemeClr val="accent1"/>
+            </a:effectRef>
+            <a:fontRef idx="minor">
+              <a:schemeClr val="lt1"/>
+            </a:fontRef>
+          </p:style>
+          <p:txBody>
+            <a:bodyPr rtlCol="0" anchor="ctr"/>
+            <a:lstStyle/>
+            <a:p>
+              <a:pPr algn="ctr"/>
+              <a:endParaRPr lang="en-GB"/>
+            </a:p>
+          </p:txBody>
+        </p:sp>
+      </p:grpSp>
       <p:pic>
         <p:nvPicPr>
           <p:cNvPr id="10" name="Picture 9"/>
@@ -11892,33 +11998,15 @@
                                   </p:childTnLst>
                                 </p:cTn>
                               </p:par>
-                            </p:childTnLst>
-                          </p:cTn>
-                        </p:par>
-                      </p:childTnLst>
-                    </p:cTn>
-                  </p:par>
-                  <p:par>
-                    <p:cTn id="39" fill="hold">
-                      <p:stCondLst>
-                        <p:cond delay="indefinite"/>
-                      </p:stCondLst>
-                      <p:childTnLst>
-                        <p:par>
-                          <p:cTn id="40" fill="hold">
-                            <p:stCondLst>
-                              <p:cond delay="0"/>
-                            </p:stCondLst>
-                            <p:childTnLst>
                               <p:par>
-                                <p:cTn id="41" presetID="1" presetClass="entr" presetSubtype="0" fill="hold" grpId="0" nodeType="clickEffect">
+                                <p:cTn id="39" presetID="1" presetClass="entr" presetSubtype="0" fill="hold" grpId="0" nodeType="withEffect">
                                   <p:stCondLst>
                                     <p:cond delay="0"/>
                                   </p:stCondLst>
                                   <p:childTnLst>
                                     <p:set>
                                       <p:cBhvr>
-                                        <p:cTn id="42" dur="1" fill="hold">
+                                        <p:cTn id="40" dur="1" fill="hold">
                                           <p:stCondLst>
                                             <p:cond delay="0"/>
                                           </p:stCondLst>
@@ -11948,26 +12036,71 @@
                     </p:cTn>
                   </p:par>
                   <p:par>
-                    <p:cTn id="43" fill="hold">
+                    <p:cTn id="41" fill="hold">
                       <p:stCondLst>
                         <p:cond delay="indefinite"/>
                       </p:stCondLst>
                       <p:childTnLst>
                         <p:par>
-                          <p:cTn id="44" fill="hold">
+                          <p:cTn id="42" fill="hold">
                             <p:stCondLst>
                               <p:cond delay="0"/>
                             </p:stCondLst>
                             <p:childTnLst>
                               <p:par>
-                                <p:cTn id="45" presetID="1" presetClass="entr" presetSubtype="0" fill="hold" nodeType="clickEffect">
+                                <p:cTn id="43" presetID="1" presetClass="entr" presetSubtype="0" fill="hold" nodeType="clickEffect">
                                   <p:stCondLst>
                                     <p:cond delay="0"/>
                                   </p:stCondLst>
                                   <p:childTnLst>
                                     <p:set>
                                       <p:cBhvr>
-                                        <p:cTn id="46" dur="1" fill="hold">
+                                        <p:cTn id="44" dur="1" fill="hold">
+                                          <p:stCondLst>
+                                            <p:cond delay="0"/>
+                                          </p:stCondLst>
+                                        </p:cTn>
+                                        <p:tgtEl>
+                                          <p:spTgt spid="8"/>
+                                        </p:tgtEl>
+                                        <p:attrNameLst>
+                                          <p:attrName>style.visibility</p:attrName>
+                                        </p:attrNameLst>
+                                      </p:cBhvr>
+                                      <p:to>
+                                        <p:strVal val="visible"/>
+                                      </p:to>
+                                    </p:set>
+                                  </p:childTnLst>
+                                </p:cTn>
+                              </p:par>
+                            </p:childTnLst>
+                          </p:cTn>
+                        </p:par>
+                      </p:childTnLst>
+                    </p:cTn>
+                  </p:par>
+                  <p:par>
+                    <p:cTn id="45" fill="hold">
+                      <p:stCondLst>
+                        <p:cond delay="indefinite"/>
+                      </p:stCondLst>
+                      <p:childTnLst>
+                        <p:par>
+                          <p:cTn id="46" fill="hold">
+                            <p:stCondLst>
+                              <p:cond delay="0"/>
+                            </p:stCondLst>
+                            <p:childTnLst>
+                              <p:par>
+                                <p:cTn id="47" presetID="1" presetClass="entr" presetSubtype="0" fill="hold" nodeType="clickEffect">
+                                  <p:stCondLst>
+                                    <p:cond delay="0"/>
+                                  </p:stCondLst>
+                                  <p:childTnLst>
+                                    <p:set>
+                                      <p:cBhvr>
+                                        <p:cTn id="48" dur="1" fill="hold">
                                           <p:stCondLst>
                                             <p:cond delay="0"/>
                                           </p:stCondLst>

</xml_diff>